<commit_message>
Change the story question?
</commit_message>
<xml_diff>
--- a/final ppt/01-web-and-you.pptx
+++ b/final ppt/01-web-and-you.pptx
@@ -326,7 +326,7 @@
           <a:p>
             <a:fld id="{0F9C1CCF-B725-44A7-AA57-5E433BD85C9F}" type="datetimeFigureOut">
               <a:rPr lang="en-US" smtClean="0"/>
-              <a:t>8/30/2021</a:t>
+              <a:t>9/1/2021</a:t>
             </a:fld>
             <a:endParaRPr lang="en-US"/>
           </a:p>
@@ -8576,12 +8576,12 @@
           </a:p>
           <a:p>
             <a:r>
-              <a:rPr lang="en-GB" dirty="0" err="1"/>
-              <a:t>Favorite</a:t>
+              <a:rPr lang="en-GB" dirty="0" smtClean="0"/>
+              <a:t>Favourite </a:t>
             </a:r>
             <a:r>
               <a:rPr lang="en-GB" dirty="0"/>
-              <a:t> food</a:t>
+              <a:t>food</a:t>
             </a:r>
           </a:p>
           <a:p>
@@ -8841,10 +8841,48 @@
           <a:bodyPr/>
           <a:lstStyle/>
           <a:p>
+            <a:pPr marL="342900" indent="-342900">
+              <a:buFont typeface="Arial" panose="020B0604020202020204" pitchFamily="34" charset="0"/>
+              <a:buChar char="•"/>
+            </a:pPr>
+            <a:r>
+              <a:rPr lang="en-GB" dirty="0" smtClean="0"/>
+              <a:t>How</a:t>
+            </a:r>
             <a:r>
               <a:rPr lang="en-GB" dirty="0"/>
-              <a:t>What’s the most important/meaningful/memorable experience you’ve had online?</a:t>
-            </a:r>
+              <a:t> do you use the web? </a:t>
+            </a:r>
+          </a:p>
+          <a:p>
+            <a:pPr marL="342900" indent="-342900">
+              <a:buFont typeface="Arial" panose="020B0604020202020204" pitchFamily="34" charset="0"/>
+              <a:buChar char="•"/>
+            </a:pPr>
+            <a:r>
+              <a:rPr lang="en-GB" dirty="0" smtClean="0"/>
+              <a:t>What</a:t>
+            </a:r>
+            <a:r>
+              <a:rPr lang="en-GB" dirty="0"/>
+              <a:t> kinds of things do you like do online?</a:t>
+            </a:r>
+          </a:p>
+          <a:p>
+            <a:r>
+              <a:rPr lang="en-GB" dirty="0"/>
+              <a:t/>
+            </a:r>
+            <a:br>
+              <a:rPr lang="en-GB" dirty="0"/>
+            </a:br>
+            <a:r>
+              <a:rPr lang="en-GB" dirty="0"/>
+              <a:t>1 minutes to think, 3 minutes each to tell a story (Teacher to go first). </a:t>
+            </a:r>
+          </a:p>
+          <a:p>
+            <a:endParaRPr lang="en-GB" dirty="0"/>
           </a:p>
           <a:p>
             <a:endParaRPr lang="en-GB" dirty="0"/>

</xml_diff>

<commit_message>
01 Web and you
</commit_message>
<xml_diff>
--- a/final ppt/01-web-and-you.pptx
+++ b/final ppt/01-web-and-you.pptx
@@ -326,7 +326,7 @@
           <a:p>
             <a:fld id="{0F9C1CCF-B725-44A7-AA57-5E433BD85C9F}" type="datetimeFigureOut">
               <a:rPr lang="en-US" smtClean="0"/>
-              <a:t>8/30/2021</a:t>
+              <a:t>9/1/2021</a:t>
             </a:fld>
             <a:endParaRPr lang="en-US"/>
           </a:p>
@@ -8576,12 +8576,12 @@
           </a:p>
           <a:p>
             <a:r>
-              <a:rPr lang="en-GB" dirty="0" err="1"/>
-              <a:t>Favorite</a:t>
+              <a:rPr lang="en-GB" dirty="0" smtClean="0"/>
+              <a:t>Favourite </a:t>
             </a:r>
             <a:r>
               <a:rPr lang="en-GB" dirty="0"/>
-              <a:t> food</a:t>
+              <a:t>food</a:t>
             </a:r>
           </a:p>
           <a:p>
@@ -8841,10 +8841,48 @@
           <a:bodyPr/>
           <a:lstStyle/>
           <a:p>
+            <a:pPr marL="342900" indent="-342900">
+              <a:buFont typeface="Arial" panose="020B0604020202020204" pitchFamily="34" charset="0"/>
+              <a:buChar char="•"/>
+            </a:pPr>
+            <a:r>
+              <a:rPr lang="en-GB" dirty="0" smtClean="0"/>
+              <a:t>How</a:t>
+            </a:r>
             <a:r>
               <a:rPr lang="en-GB" dirty="0"/>
-              <a:t>What’s the most important/meaningful/memorable experience you’ve had online?</a:t>
-            </a:r>
+              <a:t> do you use the web? </a:t>
+            </a:r>
+          </a:p>
+          <a:p>
+            <a:pPr marL="342900" indent="-342900">
+              <a:buFont typeface="Arial" panose="020B0604020202020204" pitchFamily="34" charset="0"/>
+              <a:buChar char="•"/>
+            </a:pPr>
+            <a:r>
+              <a:rPr lang="en-GB" dirty="0" smtClean="0"/>
+              <a:t>What</a:t>
+            </a:r>
+            <a:r>
+              <a:rPr lang="en-GB" dirty="0"/>
+              <a:t> kinds of things do you like do online?</a:t>
+            </a:r>
+          </a:p>
+          <a:p>
+            <a:r>
+              <a:rPr lang="en-GB" dirty="0"/>
+              <a:t/>
+            </a:r>
+            <a:br>
+              <a:rPr lang="en-GB" dirty="0"/>
+            </a:br>
+            <a:r>
+              <a:rPr lang="en-GB" dirty="0"/>
+              <a:t>1 minutes to think, 3 minutes each to tell a story (Teacher to go first). </a:t>
+            </a:r>
+          </a:p>
+          <a:p>
+            <a:endParaRPr lang="en-GB" dirty="0"/>
           </a:p>
           <a:p>
             <a:endParaRPr lang="en-GB" dirty="0"/>

</xml_diff>